<commit_message>
gpp zombieGame behavior for purgeZones added, begonnen aan pp gpp zombieGame
</commit_message>
<xml_diff>
--- a/sem_3/Gameplay_Prog/GPP_Exam/GPP_ZombieAI_LastNameFirstName_2DAEXX.pptx
+++ b/sem_3/Gameplay_Prog/GPP_Exam/GPP_ZombieAI_LastNameFirstName_2DAEXX.pptx
@@ -328,7 +328,7 @@
           <a:p>
             <a:fld id="{82085877-2B37-48E7-8B6D-4D4ED486130A}" type="datetimeFigureOut">
               <a:rPr lang="en-BE" smtClean="0"/>
-              <a:t>12/17/2021</a:t>
+              <a:t>06/01/23</a:t>
             </a:fld>
             <a:endParaRPr lang="en-BE"/>
           </a:p>
@@ -528,7 +528,7 @@
           <a:p>
             <a:fld id="{82085877-2B37-48E7-8B6D-4D4ED486130A}" type="datetimeFigureOut">
               <a:rPr lang="en-BE" smtClean="0"/>
-              <a:t>12/17/2021</a:t>
+              <a:t>06/01/23</a:t>
             </a:fld>
             <a:endParaRPr lang="en-BE"/>
           </a:p>
@@ -738,7 +738,7 @@
           <a:p>
             <a:fld id="{82085877-2B37-48E7-8B6D-4D4ED486130A}" type="datetimeFigureOut">
               <a:rPr lang="en-BE" smtClean="0"/>
-              <a:t>12/17/2021</a:t>
+              <a:t>06/01/23</a:t>
             </a:fld>
             <a:endParaRPr lang="en-BE"/>
           </a:p>
@@ -938,7 +938,7 @@
           <a:p>
             <a:fld id="{82085877-2B37-48E7-8B6D-4D4ED486130A}" type="datetimeFigureOut">
               <a:rPr lang="en-BE" smtClean="0"/>
-              <a:t>12/17/2021</a:t>
+              <a:t>06/01/23</a:t>
             </a:fld>
             <a:endParaRPr lang="en-BE"/>
           </a:p>
@@ -1214,7 +1214,7 @@
           <a:p>
             <a:fld id="{82085877-2B37-48E7-8B6D-4D4ED486130A}" type="datetimeFigureOut">
               <a:rPr lang="en-BE" smtClean="0"/>
-              <a:t>12/17/2021</a:t>
+              <a:t>06/01/23</a:t>
             </a:fld>
             <a:endParaRPr lang="en-BE"/>
           </a:p>
@@ -1482,7 +1482,7 @@
           <a:p>
             <a:fld id="{82085877-2B37-48E7-8B6D-4D4ED486130A}" type="datetimeFigureOut">
               <a:rPr lang="en-BE" smtClean="0"/>
-              <a:t>12/17/2021</a:t>
+              <a:t>06/01/23</a:t>
             </a:fld>
             <a:endParaRPr lang="en-BE"/>
           </a:p>
@@ -1897,7 +1897,7 @@
           <a:p>
             <a:fld id="{82085877-2B37-48E7-8B6D-4D4ED486130A}" type="datetimeFigureOut">
               <a:rPr lang="en-BE" smtClean="0"/>
-              <a:t>12/17/2021</a:t>
+              <a:t>06/01/23</a:t>
             </a:fld>
             <a:endParaRPr lang="en-BE"/>
           </a:p>
@@ -2039,7 +2039,7 @@
           <a:p>
             <a:fld id="{82085877-2B37-48E7-8B6D-4D4ED486130A}" type="datetimeFigureOut">
               <a:rPr lang="en-BE" smtClean="0"/>
-              <a:t>12/17/2021</a:t>
+              <a:t>06/01/23</a:t>
             </a:fld>
             <a:endParaRPr lang="en-BE"/>
           </a:p>
@@ -2152,7 +2152,7 @@
           <a:p>
             <a:fld id="{82085877-2B37-48E7-8B6D-4D4ED486130A}" type="datetimeFigureOut">
               <a:rPr lang="en-BE" smtClean="0"/>
-              <a:t>12/17/2021</a:t>
+              <a:t>06/01/23</a:t>
             </a:fld>
             <a:endParaRPr lang="en-BE"/>
           </a:p>
@@ -2465,7 +2465,7 @@
           <a:p>
             <a:fld id="{82085877-2B37-48E7-8B6D-4D4ED486130A}" type="datetimeFigureOut">
               <a:rPr lang="en-BE" smtClean="0"/>
-              <a:t>12/17/2021</a:t>
+              <a:t>06/01/23</a:t>
             </a:fld>
             <a:endParaRPr lang="en-BE"/>
           </a:p>
@@ -2754,7 +2754,7 @@
           <a:p>
             <a:fld id="{82085877-2B37-48E7-8B6D-4D4ED486130A}" type="datetimeFigureOut">
               <a:rPr lang="en-BE" smtClean="0"/>
-              <a:t>12/17/2021</a:t>
+              <a:t>06/01/23</a:t>
             </a:fld>
             <a:endParaRPr lang="en-BE"/>
           </a:p>
@@ -2997,7 +2997,7 @@
           <a:p>
             <a:fld id="{82085877-2B37-48E7-8B6D-4D4ED486130A}" type="datetimeFigureOut">
               <a:rPr lang="en-BE" smtClean="0"/>
-              <a:t>12/17/2021</a:t>
+              <a:t>06/01/23</a:t>
             </a:fld>
             <a:endParaRPr lang="en-BE"/>
           </a:p>
@@ -3443,59 +3443,6 @@
           </a:p>
         </p:txBody>
       </p:sp>
-      <p:sp>
-        <p:nvSpPr>
-          <p:cNvPr id="3" name="Subtitle 2">
-            <a:extLst>
-              <a:ext uri="{FF2B5EF4-FFF2-40B4-BE49-F238E27FC236}">
-                <a16:creationId xmlns:a16="http://schemas.microsoft.com/office/drawing/2014/main" id="{510651AA-5F60-4B6E-8386-AEA67C018DF4}"/>
-              </a:ext>
-            </a:extLst>
-          </p:cNvPr>
-          <p:cNvSpPr>
-            <a:spLocks noGrp="1"/>
-          </p:cNvSpPr>
-          <p:nvPr>
-            <p:ph type="subTitle" idx="1"/>
-          </p:nvPr>
-        </p:nvSpPr>
-        <p:spPr/>
-        <p:txBody>
-          <a:bodyPr/>
-          <a:lstStyle/>
-          <a:p>
-            <a:r>
-              <a:rPr lang="en-US" i="1">
-                <a:solidFill>
-                  <a:schemeClr val="bg1">
-                    <a:lumMod val="75000"/>
-                  </a:schemeClr>
-                </a:solidFill>
-              </a:rPr>
-              <a:t>Delete all comments after reading</a:t>
-            </a:r>
-          </a:p>
-          <a:p>
-            <a:r>
-              <a:rPr lang="en-US" i="1">
-                <a:solidFill>
-                  <a:schemeClr val="bg1">
-                    <a:lumMod val="75000"/>
-                  </a:schemeClr>
-                </a:solidFill>
-              </a:rPr>
-              <a:t>You are not allowed to add more slides to this presentation</a:t>
-            </a:r>
-            <a:endParaRPr lang="en-BE" i="1">
-              <a:solidFill>
-                <a:schemeClr val="bg1">
-                  <a:lumMod val="75000"/>
-                </a:schemeClr>
-              </a:solidFill>
-            </a:endParaRPr>
-          </a:p>
-        </p:txBody>
-      </p:sp>
     </p:spTree>
     <p:extLst>
       <p:ext uri="{BB962C8B-B14F-4D97-AF65-F5344CB8AC3E}">
@@ -3709,6 +3656,36 @@
           </a:p>
         </p:txBody>
       </p:sp>
+      <p:pic>
+        <p:nvPicPr>
+          <p:cNvPr id="7" name="Picture 6">
+            <a:extLst>
+              <a:ext uri="{FF2B5EF4-FFF2-40B4-BE49-F238E27FC236}">
+                <a16:creationId xmlns:a16="http://schemas.microsoft.com/office/drawing/2014/main" id="{C769C23B-6440-26D8-F9BE-BBF3408E0A63}"/>
+              </a:ext>
+            </a:extLst>
+          </p:cNvPr>
+          <p:cNvPicPr>
+            <a:picLocks noChangeAspect="1"/>
+          </p:cNvPicPr>
+          <p:nvPr/>
+        </p:nvPicPr>
+        <p:blipFill>
+          <a:blip r:embed="rId2"/>
+          <a:stretch>
+            <a:fillRect/>
+          </a:stretch>
+        </p:blipFill>
+        <p:spPr>
+          <a:xfrm>
+            <a:off x="674865" y="1647576"/>
+            <a:ext cx="10450383" cy="3562847"/>
+          </a:xfrm>
+          <a:prstGeom prst="rect">
+            <a:avLst/>
+          </a:prstGeom>
+        </p:spPr>
+      </p:pic>
     </p:spTree>
     <p:extLst>
       <p:ext uri="{BB962C8B-B14F-4D97-AF65-F5344CB8AC3E}">
@@ -3812,6 +3789,66 @@
           </a:p>
         </p:txBody>
       </p:sp>
+      <p:pic>
+        <p:nvPicPr>
+          <p:cNvPr id="5" name="Picture 4">
+            <a:extLst>
+              <a:ext uri="{FF2B5EF4-FFF2-40B4-BE49-F238E27FC236}">
+                <a16:creationId xmlns:a16="http://schemas.microsoft.com/office/drawing/2014/main" id="{6E9D7F65-C77D-26E3-F4EB-AF1623B7BB60}"/>
+              </a:ext>
+            </a:extLst>
+          </p:cNvPr>
+          <p:cNvPicPr>
+            <a:picLocks noChangeAspect="1"/>
+          </p:cNvPicPr>
+          <p:nvPr/>
+        </p:nvPicPr>
+        <p:blipFill>
+          <a:blip r:embed="rId2"/>
+          <a:stretch>
+            <a:fillRect/>
+          </a:stretch>
+        </p:blipFill>
+        <p:spPr>
+          <a:xfrm>
+            <a:off x="3932482" y="368097"/>
+            <a:ext cx="5334744" cy="1457528"/>
+          </a:xfrm>
+          <a:prstGeom prst="rect">
+            <a:avLst/>
+          </a:prstGeom>
+        </p:spPr>
+      </p:pic>
+      <p:pic>
+        <p:nvPicPr>
+          <p:cNvPr id="7" name="Picture 6">
+            <a:extLst>
+              <a:ext uri="{FF2B5EF4-FFF2-40B4-BE49-F238E27FC236}">
+                <a16:creationId xmlns:a16="http://schemas.microsoft.com/office/drawing/2014/main" id="{72FAD273-361A-E213-8363-71F97C99716A}"/>
+              </a:ext>
+            </a:extLst>
+          </p:cNvPr>
+          <p:cNvPicPr>
+            <a:picLocks noChangeAspect="1"/>
+          </p:cNvPicPr>
+          <p:nvPr/>
+        </p:nvPicPr>
+        <p:blipFill>
+          <a:blip r:embed="rId3"/>
+          <a:stretch>
+            <a:fillRect/>
+          </a:stretch>
+        </p:blipFill>
+        <p:spPr>
+          <a:xfrm>
+            <a:off x="0" y="1845675"/>
+            <a:ext cx="12192000" cy="4644228"/>
+          </a:xfrm>
+          <a:prstGeom prst="rect">
+            <a:avLst/>
+          </a:prstGeom>
+        </p:spPr>
+      </p:pic>
     </p:spTree>
     <p:extLst>
       <p:ext uri="{BB962C8B-B14F-4D97-AF65-F5344CB8AC3E}">
@@ -4630,6 +4667,15 @@
 </file>
 
 <file path=customXml/item2.xml><?xml version="1.0" encoding="utf-8"?>
+<?mso-contentType ?>
+<FormTemplates xmlns="http://schemas.microsoft.com/sharepoint/v3/contenttype/forms">
+  <Display>DocumentLibraryForm</Display>
+  <Edit>DocumentLibraryForm</Edit>
+  <New>DocumentLibraryForm</New>
+</FormTemplates>
+</file>
+
+<file path=customXml/item3.xml><?xml version="1.0" encoding="utf-8"?>
 <p:properties xmlns:p="http://schemas.microsoft.com/office/2006/metadata/properties" xmlns:xsi="http://www.w3.org/2001/XMLSchema-instance" xmlns:pc="http://schemas.microsoft.com/office/infopath/2007/PartnerControls">
   <documentManagement>
     <IconOverlay xmlns="http://schemas.microsoft.com/sharepoint/v4" xsi:nil="true"/>
@@ -4644,34 +4690,43 @@
 </p:properties>
 </file>
 
-<file path=customXml/item3.xml><?xml version="1.0" encoding="utf-8"?>
-<?mso-contentType ?>
-<FormTemplates xmlns="http://schemas.microsoft.com/sharepoint/v3/contenttype/forms">
-  <Display>DocumentLibraryForm</Display>
-  <Edit>DocumentLibraryForm</Edit>
-  <New>DocumentLibraryForm</New>
-</FormTemplates>
-</file>
-
 <file path=customXml/itemProps1.xml><?xml version="1.0" encoding="utf-8"?>
-<ds:datastoreItem xmlns:ds="http://schemas.openxmlformats.org/officeDocument/2006/customXml" ds:itemID="{CB95CD2F-7AF1-41D4-B9F6-F2104A185175}"/>
+<ds:datastoreItem xmlns:ds="http://schemas.openxmlformats.org/officeDocument/2006/customXml" ds:itemID="{CB95CD2F-7AF1-41D4-B9F6-F2104A185175}">
+  <ds:schemaRefs>
+    <ds:schemaRef ds:uri="http://schemas.microsoft.com/office/2006/metadata/contentType"/>
+    <ds:schemaRef ds:uri="http://schemas.microsoft.com/office/2006/metadata/properties/metaAttributes"/>
+    <ds:schemaRef ds:uri="http://www.w3.org/2001/XMLSchema"/>
+    <ds:schemaRef ds:uri="http://schemas.microsoft.com/office/2006/metadata/properties"/>
+    <ds:schemaRef ds:uri="128482ec-0431-40d5-ab26-89ea2a4f3ccd"/>
+    <ds:schemaRef ds:uri="60eb0cf4-ae2a-4762-800a-cb593b869ecb"/>
+    <ds:schemaRef ds:uri="http://schemas.microsoft.com/sharepoint/v4"/>
+    <ds:schemaRef ds:uri="a2e691a9-fcfc-4d85-a390-1894fe98bd9e"/>
+    <ds:schemaRef ds:uri="http://schemas.microsoft.com/office/2006/documentManagement/types"/>
+    <ds:schemaRef ds:uri="http://schemas.microsoft.com/office/infopath/2007/PartnerControls"/>
+    <ds:schemaRef ds:uri="http://schemas.openxmlformats.org/package/2006/metadata/core-properties"/>
+    <ds:schemaRef ds:uri="http://purl.org/dc/elements/1.1/"/>
+    <ds:schemaRef ds:uri="http://purl.org/dc/terms/"/>
+    <ds:schemaRef ds:uri="http://schemas.microsoft.com/internal/obd"/>
+  </ds:schemaRefs>
+</ds:datastoreItem>
 </file>
 
 <file path=customXml/itemProps2.xml><?xml version="1.0" encoding="utf-8"?>
+<ds:datastoreItem xmlns:ds="http://schemas.openxmlformats.org/officeDocument/2006/customXml" ds:itemID="{AF8EC6D1-CB19-4400-AD0A-0C75CD884AEA}">
+  <ds:schemaRefs>
+    <ds:schemaRef ds:uri="http://schemas.microsoft.com/sharepoint/v3/contenttype/forms"/>
+  </ds:schemaRefs>
+</ds:datastoreItem>
+</file>
+
+<file path=customXml/itemProps3.xml><?xml version="1.0" encoding="utf-8"?>
 <ds:datastoreItem xmlns:ds="http://schemas.openxmlformats.org/officeDocument/2006/customXml" ds:itemID="{B743389A-7EE0-4951-8919-E91DD69E3687}">
   <ds:schemaRefs>
     <ds:schemaRef ds:uri="128482ec-0431-40d5-ab26-89ea2a4f3ccd"/>
     <ds:schemaRef ds:uri="http://schemas.microsoft.com/office/2006/metadata/properties"/>
     <ds:schemaRef ds:uri="http://schemas.microsoft.com/office/infopath/2007/PartnerControls"/>
     <ds:schemaRef ds:uri="http://schemas.microsoft.com/sharepoint/v4"/>
-  </ds:schemaRefs>
-</ds:datastoreItem>
-</file>
-
-<file path=customXml/itemProps3.xml><?xml version="1.0" encoding="utf-8"?>
-<ds:datastoreItem xmlns:ds="http://schemas.openxmlformats.org/officeDocument/2006/customXml" ds:itemID="{AF8EC6D1-CB19-4400-AD0A-0C75CD884AEA}">
-  <ds:schemaRefs>
-    <ds:schemaRef ds:uri="http://schemas.microsoft.com/sharepoint/v3/contenttype/forms"/>
+    <ds:schemaRef ds:uri="60eb0cf4-ae2a-4762-800a-cb593b869ecb"/>
   </ds:schemaRefs>
 </ds:datastoreItem>
 </file>
</xml_diff>